<commit_message>
poster rough draft (poster2)
</commit_message>
<xml_diff>
--- a/Documentation/poster/poster2.pptx
+++ b/Documentation/poster/poster2.pptx
@@ -3296,7 +3296,7 @@
           <a:blip r:embed="rId2" cstate="print">
             <a:extLst>
               <a:ext uri="{28A0092B-C50C-407E-A947-70E740481C1C}">
-                <a14:useLocalDpi xmlns="" xmlns:a14="http://schemas.microsoft.com/office/drawing/2010/main" val="0"/>
+                <a14:useLocalDpi xmlns:a14="http://schemas.microsoft.com/office/drawing/2010/main" xmlns="" val="0"/>
               </a:ext>
             </a:extLst>
           </a:blip>
@@ -3378,7 +3378,7 @@
           <a:blip r:embed="rId3" cstate="print">
             <a:extLst>
               <a:ext uri="{28A0092B-C50C-407E-A947-70E740481C1C}">
-                <a14:useLocalDpi xmlns="" xmlns:a14="http://schemas.microsoft.com/office/drawing/2010/main" val="0"/>
+                <a14:useLocalDpi xmlns:a14="http://schemas.microsoft.com/office/drawing/2010/main" xmlns="" val="0"/>
               </a:ext>
             </a:extLst>
           </a:blip>
@@ -3675,7 +3675,7 @@
           <a:blip r:embed="rId4" cstate="print">
             <a:extLst>
               <a:ext uri="{28A0092B-C50C-407E-A947-70E740481C1C}">
-                <a14:useLocalDpi xmlns="" xmlns:a14="http://schemas.microsoft.com/office/drawing/2010/main" val="0"/>
+                <a14:useLocalDpi xmlns:a14="http://schemas.microsoft.com/office/drawing/2010/main" xmlns="" val="0"/>
               </a:ext>
             </a:extLst>
           </a:blip>
@@ -3778,7 +3778,7 @@
           <a:blip r:embed="rId5" cstate="print">
             <a:extLst>
               <a:ext uri="{28A0092B-C50C-407E-A947-70E740481C1C}">
-                <a14:useLocalDpi xmlns="" xmlns:a14="http://schemas.microsoft.com/office/drawing/2010/main" val="0"/>
+                <a14:useLocalDpi xmlns:a14="http://schemas.microsoft.com/office/drawing/2010/main" xmlns="" val="0"/>
               </a:ext>
             </a:extLst>
           </a:blip>
@@ -4085,25 +4085,7 @@
                 </a:solidFill>
                 <a:latin typeface="Calibri" panose="020F0502020204030204" pitchFamily="34" charset="0"/>
               </a:rPr>
-              <a:t>Interface with Sightline SLA-1500 to add </a:t>
-            </a:r>
-            <a:r>
-              <a:rPr lang="en-US" sz="3600" dirty="0" smtClean="0">
-                <a:solidFill>
-                  <a:schemeClr val="tx1"/>
-                </a:solidFill>
-                <a:latin typeface="Calibri" panose="020F0502020204030204" pitchFamily="34" charset="0"/>
-              </a:rPr>
-              <a:t>automatic </a:t>
-            </a:r>
-            <a:r>
-              <a:rPr lang="en-US" sz="3600" dirty="0" smtClean="0">
-                <a:solidFill>
-                  <a:schemeClr val="tx1"/>
-                </a:solidFill>
-                <a:latin typeface="Calibri" panose="020F0502020204030204" pitchFamily="34" charset="0"/>
-              </a:rPr>
-              <a:t>tracking</a:t>
+              <a:t>Interface with Sightline SLA-1500 to add automatic tracking</a:t>
             </a:r>
           </a:p>
           <a:p>
@@ -4290,7 +4272,7 @@
               <a:blip r:embed="rId6" cstate="print">
                 <a:extLst>
                   <a:ext uri="{28A0092B-C50C-407E-A947-70E740481C1C}">
-                    <a14:useLocalDpi xmlns="" xmlns:a14="http://schemas.microsoft.com/office/drawing/2010/main" val="0"/>
+                    <a14:useLocalDpi xmlns:a14="http://schemas.microsoft.com/office/drawing/2010/main" xmlns="" val="0"/>
                   </a:ext>
                 </a:extLst>
               </a:blip>
@@ -4488,7 +4470,7 @@
             <a:blip r:embed="rId7" cstate="print">
               <a:extLst>
                 <a:ext uri="{28A0092B-C50C-407E-A947-70E740481C1C}">
-                  <a14:useLocalDpi xmlns="" xmlns:a14="http://schemas.microsoft.com/office/drawing/2010/main" val="0"/>
+                  <a14:useLocalDpi xmlns:a14="http://schemas.microsoft.com/office/drawing/2010/main" xmlns="" val="0"/>
                 </a:ext>
               </a:extLst>
             </a:blip>
@@ -4508,7 +4490,7 @@
             <a:noFill/>
             <a:extLst>
               <a:ext uri="{909E8E84-426E-40DD-AFC4-6F175D3DCCD1}">
-                <a14:hiddenFill xmlns="" xmlns:a14="http://schemas.microsoft.com/office/drawing/2010/main">
+                <a14:hiddenFill xmlns:a14="http://schemas.microsoft.com/office/drawing/2010/main" xmlns="">
                   <a:solidFill>
                     <a:srgbClr val="FFFFFF"/>
                   </a:solidFill>
@@ -4684,7 +4666,7 @@
             <a:blip r:embed="rId8" cstate="print">
               <a:extLst>
                 <a:ext uri="{28A0092B-C50C-407E-A947-70E740481C1C}">
-                  <a14:useLocalDpi xmlns="" xmlns:a14="http://schemas.microsoft.com/office/drawing/2010/main" val="0"/>
+                  <a14:useLocalDpi xmlns:a14="http://schemas.microsoft.com/office/drawing/2010/main" xmlns="" val="0"/>
                 </a:ext>
               </a:extLst>
             </a:blip>
@@ -4709,7 +4691,7 @@
             </a:ln>
             <a:extLst>
               <a:ext uri="{909E8E84-426E-40DD-AFC4-6F175D3DCCD1}">
-                <a14:hiddenFill xmlns="" xmlns:a14="http://schemas.microsoft.com/office/drawing/2010/main">
+                <a14:hiddenFill xmlns:a14="http://schemas.microsoft.com/office/drawing/2010/main" xmlns="">
                   <a:solidFill>
                     <a:srgbClr val="FFFFFF"/>
                   </a:solidFill>
@@ -4737,7 +4719,7 @@
               </a:duotone>
               <a:extLst>
                 <a:ext uri="{BEBA8EAE-BF5A-486C-A8C5-ECC9F3942E4B}">
-                  <a14:imgProps xmlns="" xmlns:a14="http://schemas.microsoft.com/office/drawing/2010/main">
+                  <a14:imgProps xmlns:a14="http://schemas.microsoft.com/office/drawing/2010/main" xmlns="">
                     <a14:imgLayer r:embed="rId10">
                       <a14:imgEffect>
                         <a14:saturation sat="400000"/>
@@ -4746,7 +4728,7 @@
                   </a14:imgProps>
                 </a:ext>
                 <a:ext uri="{28A0092B-C50C-407E-A947-70E740481C1C}">
-                  <a14:useLocalDpi xmlns="" xmlns:a14="http://schemas.microsoft.com/office/drawing/2010/main" val="0"/>
+                  <a14:useLocalDpi xmlns:a14="http://schemas.microsoft.com/office/drawing/2010/main" xmlns="" val="0"/>
                 </a:ext>
               </a:extLst>
             </a:blip>
@@ -4766,7 +4748,7 @@
             <a:noFill/>
             <a:extLst>
               <a:ext uri="{909E8E84-426E-40DD-AFC4-6F175D3DCCD1}">
-                <a14:hiddenFill xmlns="" xmlns:a14="http://schemas.microsoft.com/office/drawing/2010/main">
+                <a14:hiddenFill xmlns:a14="http://schemas.microsoft.com/office/drawing/2010/main" xmlns="">
                   <a:solidFill>
                     <a:srgbClr val="FFFFFF"/>
                   </a:solidFill>
@@ -5029,7 +5011,7 @@
             <a:blip r:embed="rId11" cstate="print">
               <a:extLst>
                 <a:ext uri="{28A0092B-C50C-407E-A947-70E740481C1C}">
-                  <a14:useLocalDpi xmlns="" xmlns:a14="http://schemas.microsoft.com/office/drawing/2010/main" val="0"/>
+                  <a14:useLocalDpi xmlns:a14="http://schemas.microsoft.com/office/drawing/2010/main" xmlns="" val="0"/>
                 </a:ext>
               </a:extLst>
             </a:blip>
@@ -5049,7 +5031,7 @@
             <a:noFill/>
             <a:extLst>
               <a:ext uri="{909E8E84-426E-40DD-AFC4-6F175D3DCCD1}">
-                <a14:hiddenFill xmlns="" xmlns:a14="http://schemas.microsoft.com/office/drawing/2010/main">
+                <a14:hiddenFill xmlns:a14="http://schemas.microsoft.com/office/drawing/2010/main" xmlns="">
                   <a:solidFill>
                     <a:srgbClr val="FFFFFF"/>
                   </a:solidFill>
@@ -5109,7 +5091,7 @@
             <a:blip r:embed="rId12" cstate="print">
               <a:extLst>
                 <a:ext uri="{28A0092B-C50C-407E-A947-70E740481C1C}">
-                  <a14:useLocalDpi xmlns="" xmlns:a14="http://schemas.microsoft.com/office/drawing/2010/main" val="0"/>
+                  <a14:useLocalDpi xmlns:a14="http://schemas.microsoft.com/office/drawing/2010/main" xmlns="" val="0"/>
                 </a:ext>
               </a:extLst>
             </a:blip>
@@ -5129,7 +5111,7 @@
             <a:noFill/>
             <a:extLst>
               <a:ext uri="{909E8E84-426E-40DD-AFC4-6F175D3DCCD1}">
-                <a14:hiddenFill xmlns="" xmlns:a14="http://schemas.microsoft.com/office/drawing/2010/main">
+                <a14:hiddenFill xmlns:a14="http://schemas.microsoft.com/office/drawing/2010/main" xmlns="">
                   <a:solidFill>
                     <a:srgbClr val="FFFFFF"/>
                   </a:solidFill>
@@ -5866,7 +5848,7 @@
         </p:nvGrpSpPr>
         <p:grpSpPr>
           <a:xfrm>
-            <a:off x="29718000" y="25051558"/>
+            <a:off x="29718000" y="24841200"/>
             <a:ext cx="13258800" cy="7201840"/>
             <a:chOff x="29718000" y="24725960"/>
             <a:chExt cx="13258800" cy="7201840"/>
@@ -5984,6 +5966,37 @@
           </a:fontRef>
         </p:style>
       </p:cxnSp>
+      <p:pic>
+        <p:nvPicPr>
+          <p:cNvPr id="5" name="Picture 2" descr="http://psas.pdx.edu/rockettracks/GMD_running.jpg"/>
+          <p:cNvPicPr>
+            <a:picLocks noChangeAspect="1" noChangeArrowheads="1"/>
+          </p:cNvPicPr>
+          <p:nvPr/>
+        </p:nvPicPr>
+        <p:blipFill>
+          <a:blip r:embed="rId14" cstate="print"/>
+          <a:srcRect t="23366" b="25023"/>
+          <a:stretch>
+            <a:fillRect/>
+          </a:stretch>
+        </p:blipFill>
+        <p:spPr bwMode="auto">
+          <a:xfrm>
+            <a:off x="14709648" y="26974800"/>
+            <a:ext cx="14474952" cy="5001816"/>
+          </a:xfrm>
+          <a:prstGeom prst="roundRect">
+            <a:avLst/>
+          </a:prstGeom>
+          <a:noFill/>
+          <a:ln w="76200">
+            <a:solidFill>
+              <a:srgbClr val="6A7F10"/>
+            </a:solidFill>
+          </a:ln>
+        </p:spPr>
+      </p:pic>
     </p:spTree>
   </p:cSld>
   <p:clrMapOvr>

</xml_diff>

<commit_message>
Updated poster2 power point.
</commit_message>
<xml_diff>
--- a/Documentation/poster/poster2.pptx
+++ b/Documentation/poster/poster2.pptx
@@ -219,7 +219,7 @@
             <a:fld id="{D9D26CB9-01E4-44B8-8084-BCC418CF4A2D}" type="datetimeFigureOut">
               <a:rPr lang="en-US" smtClean="0"/>
               <a:pPr/>
-              <a:t>5/25/2014</a:t>
+              <a:t>5/26/2014</a:t>
             </a:fld>
             <a:endParaRPr lang="en-US"/>
           </a:p>
@@ -447,7 +447,7 @@
             <a:fld id="{D9D26CB9-01E4-44B8-8084-BCC418CF4A2D}" type="datetimeFigureOut">
               <a:rPr lang="en-US" smtClean="0"/>
               <a:pPr/>
-              <a:t>5/25/2014</a:t>
+              <a:t>5/26/2014</a:t>
             </a:fld>
             <a:endParaRPr lang="en-US"/>
           </a:p>
@@ -624,7 +624,7 @@
             <a:fld id="{D9D26CB9-01E4-44B8-8084-BCC418CF4A2D}" type="datetimeFigureOut">
               <a:rPr lang="en-US" smtClean="0"/>
               <a:pPr/>
-              <a:t>5/25/2014</a:t>
+              <a:t>5/26/2014</a:t>
             </a:fld>
             <a:endParaRPr lang="en-US"/>
           </a:p>
@@ -791,7 +791,7 @@
             <a:fld id="{D9D26CB9-01E4-44B8-8084-BCC418CF4A2D}" type="datetimeFigureOut">
               <a:rPr lang="en-US" smtClean="0"/>
               <a:pPr/>
-              <a:t>5/25/2014</a:t>
+              <a:t>5/26/2014</a:t>
             </a:fld>
             <a:endParaRPr lang="en-US"/>
           </a:p>
@@ -1032,7 +1032,7 @@
             <a:fld id="{D9D26CB9-01E4-44B8-8084-BCC418CF4A2D}" type="datetimeFigureOut">
               <a:rPr lang="en-US" smtClean="0"/>
               <a:pPr/>
-              <a:t>5/25/2014</a:t>
+              <a:t>5/26/2014</a:t>
             </a:fld>
             <a:endParaRPr lang="en-US"/>
           </a:p>
@@ -1298,7 +1298,7 @@
             <a:fld id="{D9D26CB9-01E4-44B8-8084-BCC418CF4A2D}" type="datetimeFigureOut">
               <a:rPr lang="en-US" smtClean="0"/>
               <a:pPr/>
-              <a:t>5/25/2014</a:t>
+              <a:t>5/26/2014</a:t>
             </a:fld>
             <a:endParaRPr lang="en-US"/>
           </a:p>
@@ -1674,7 +1674,7 @@
             <a:fld id="{D9D26CB9-01E4-44B8-8084-BCC418CF4A2D}" type="datetimeFigureOut">
               <a:rPr lang="en-US" smtClean="0"/>
               <a:pPr/>
-              <a:t>5/25/2014</a:t>
+              <a:t>5/26/2014</a:t>
             </a:fld>
             <a:endParaRPr lang="en-US"/>
           </a:p>
@@ -1789,7 +1789,7 @@
             <a:fld id="{D9D26CB9-01E4-44B8-8084-BCC418CF4A2D}" type="datetimeFigureOut">
               <a:rPr lang="en-US" smtClean="0"/>
               <a:pPr/>
-              <a:t>5/25/2014</a:t>
+              <a:t>5/26/2014</a:t>
             </a:fld>
             <a:endParaRPr lang="en-US"/>
           </a:p>
@@ -1881,7 +1881,7 @@
             <a:fld id="{D9D26CB9-01E4-44B8-8084-BCC418CF4A2D}" type="datetimeFigureOut">
               <a:rPr lang="en-US" smtClean="0"/>
               <a:pPr/>
-              <a:t>5/25/2014</a:t>
+              <a:t>5/26/2014</a:t>
             </a:fld>
             <a:endParaRPr lang="en-US"/>
           </a:p>
@@ -2141,7 +2141,7 @@
             <a:fld id="{D9D26CB9-01E4-44B8-8084-BCC418CF4A2D}" type="datetimeFigureOut">
               <a:rPr lang="en-US" smtClean="0"/>
               <a:pPr/>
-              <a:t>5/25/2014</a:t>
+              <a:t>5/26/2014</a:t>
             </a:fld>
             <a:endParaRPr lang="en-US"/>
           </a:p>
@@ -2407,7 +2407,7 @@
             <a:fld id="{D9D26CB9-01E4-44B8-8084-BCC418CF4A2D}" type="datetimeFigureOut">
               <a:rPr lang="en-US" smtClean="0"/>
               <a:pPr/>
-              <a:t>5/25/2014</a:t>
+              <a:t>5/26/2014</a:t>
             </a:fld>
             <a:endParaRPr lang="en-US"/>
           </a:p>
@@ -2626,7 +2626,7 @@
             <a:fld id="{D9D26CB9-01E4-44B8-8084-BCC418CF4A2D}" type="datetimeFigureOut">
               <a:rPr lang="en-US" smtClean="0"/>
               <a:pPr/>
-              <a:t>5/25/2014</a:t>
+              <a:t>5/26/2014</a:t>
             </a:fld>
             <a:endParaRPr lang="en-US"/>
           </a:p>
@@ -3296,7 +3296,7 @@
           <a:blip r:embed="rId2" cstate="print">
             <a:extLst>
               <a:ext uri="{28A0092B-C50C-407E-A947-70E740481C1C}">
-                <a14:useLocalDpi xmlns:a14="http://schemas.microsoft.com/office/drawing/2010/main" xmlns="" val="0"/>
+                <a14:useLocalDpi xmlns="" xmlns:a14="http://schemas.microsoft.com/office/drawing/2010/main" val="0"/>
               </a:ext>
             </a:extLst>
           </a:blip>
@@ -3378,7 +3378,7 @@
           <a:blip r:embed="rId3" cstate="print">
             <a:extLst>
               <a:ext uri="{28A0092B-C50C-407E-A947-70E740481C1C}">
-                <a14:useLocalDpi xmlns:a14="http://schemas.microsoft.com/office/drawing/2010/main" xmlns="" val="0"/>
+                <a14:useLocalDpi xmlns="" xmlns:a14="http://schemas.microsoft.com/office/drawing/2010/main" val="0"/>
               </a:ext>
             </a:extLst>
           </a:blip>
@@ -3572,13 +3572,70 @@
           <a:p>
             <a:pPr algn="ctr"/>
             <a:r>
-              <a:rPr lang="en-US" sz="3600" dirty="0">
+              <a:rPr lang="en-US" sz="3600" b="1" dirty="0">
                 <a:solidFill>
                   <a:schemeClr val="tx1"/>
                 </a:solidFill>
                 <a:latin typeface="Calibri" panose="020F0502020204030204" pitchFamily="34" charset="0"/>
               </a:rPr>
-              <a:t>What good is a high tech rocket if you can’t track it? Current methods of tracking are limited by dependence on human eye</a:t>
+              <a:t>What good is a high tech rocket if you can’t track it</a:t>
+            </a:r>
+            <a:r>
+              <a:rPr lang="en-US" sz="3600" b="1" dirty="0" smtClean="0">
+                <a:solidFill>
+                  <a:schemeClr val="tx1"/>
+                </a:solidFill>
+                <a:latin typeface="Calibri" panose="020F0502020204030204" pitchFamily="34" charset="0"/>
+              </a:rPr>
+              <a:t>?</a:t>
+            </a:r>
+          </a:p>
+          <a:p>
+            <a:pPr algn="ctr"/>
+            <a:r>
+              <a:rPr lang="en-US" sz="3600" dirty="0" smtClean="0">
+                <a:solidFill>
+                  <a:schemeClr val="tx1"/>
+                </a:solidFill>
+                <a:latin typeface="Calibri" panose="020F0502020204030204" pitchFamily="34" charset="0"/>
+              </a:rPr>
+              <a:t>Current PSAS </a:t>
+            </a:r>
+            <a:r>
+              <a:rPr lang="en-US" sz="3600" dirty="0">
+                <a:solidFill>
+                  <a:schemeClr val="tx1"/>
+                </a:solidFill>
+                <a:latin typeface="Calibri" panose="020F0502020204030204" pitchFamily="34" charset="0"/>
+              </a:rPr>
+              <a:t>methods of tracking are limited </a:t>
+            </a:r>
+            <a:r>
+              <a:rPr lang="en-US" sz="3600" dirty="0" smtClean="0">
+                <a:solidFill>
+                  <a:schemeClr val="tx1"/>
+                </a:solidFill>
+                <a:latin typeface="Calibri" panose="020F0502020204030204" pitchFamily="34" charset="0"/>
+              </a:rPr>
+              <a:t>by</a:t>
+            </a:r>
+            <a:r>
+              <a:rPr lang="en-US" sz="3600" dirty="0" smtClean="0">
+                <a:solidFill>
+                  <a:schemeClr val="tx1"/>
+                </a:solidFill>
+                <a:latin typeface="Calibri" panose="020F0502020204030204" pitchFamily="34" charset="0"/>
+              </a:rPr>
+              <a:t> dependence </a:t>
+            </a:r>
+            <a:r>
+              <a:rPr lang="en-US" sz="3600" dirty="0">
+                <a:solidFill>
+                  <a:schemeClr val="tx1"/>
+                </a:solidFill>
+                <a:latin typeface="Calibri" panose="020F0502020204030204" pitchFamily="34" charset="0"/>
+              </a:rPr>
+              <a:t>on human eye</a:t>
             </a:r>
             <a:r>
               <a:rPr lang="en-US" sz="3600" dirty="0" smtClean="0">
@@ -3606,8 +3663,8 @@
         </p:nvSpPr>
         <p:spPr>
           <a:xfrm>
-            <a:off x="1175823" y="11201400"/>
-            <a:ext cx="7129977" cy="2667000"/>
+            <a:off x="1175822" y="11201400"/>
+            <a:ext cx="7342632" cy="2667000"/>
           </a:xfrm>
           <a:prstGeom prst="roundRect">
             <a:avLst/>
@@ -3646,13 +3703,61 @@
           <a:p>
             <a:pPr algn="ctr"/>
             <a:r>
-              <a:rPr lang="en-US" sz="3600" dirty="0" smtClean="0">
+              <a:rPr lang="en-US" sz="3600" b="1" dirty="0" smtClean="0">
                 <a:solidFill>
                   <a:schemeClr val="tx1"/>
                 </a:solidFill>
                 <a:latin typeface="Calibri" panose="020F0502020204030204" pitchFamily="34" charset="0"/>
               </a:rPr>
-              <a:t>Rockets move fast. Keeping antennas and cameras pointed at them is hard.</a:t>
+              <a:t>Rockets move fast. </a:t>
+            </a:r>
+          </a:p>
+          <a:p>
+            <a:pPr algn="ctr"/>
+            <a:r>
+              <a:rPr lang="en-US" sz="3600" dirty="0" smtClean="0">
+                <a:solidFill>
+                  <a:schemeClr val="tx1"/>
+                </a:solidFill>
+                <a:latin typeface="Calibri" panose="020F0502020204030204" pitchFamily="34" charset="0"/>
+              </a:rPr>
+              <a:t>Keeping </a:t>
+            </a:r>
+            <a:r>
+              <a:rPr lang="en-US" sz="3600" dirty="0" smtClean="0">
+                <a:solidFill>
+                  <a:schemeClr val="tx1"/>
+                </a:solidFill>
+                <a:latin typeface="Calibri" panose="020F0502020204030204" pitchFamily="34" charset="0"/>
+              </a:rPr>
+              <a:t>antennas and cameras pointed at </a:t>
+            </a:r>
+            <a:r>
+              <a:rPr lang="en-US" sz="3600" dirty="0" smtClean="0">
+                <a:solidFill>
+                  <a:schemeClr val="tx1"/>
+                </a:solidFill>
+                <a:latin typeface="Calibri" panose="020F0502020204030204" pitchFamily="34" charset="0"/>
+              </a:rPr>
+              <a:t>them during flight </a:t>
+            </a:r>
+            <a:r>
+              <a:rPr lang="en-US" sz="3600" dirty="0" smtClean="0">
+                <a:solidFill>
+                  <a:schemeClr val="tx1"/>
+                </a:solidFill>
+                <a:latin typeface="Calibri" panose="020F0502020204030204" pitchFamily="34" charset="0"/>
+              </a:rPr>
+              <a:t>is </a:t>
+            </a:r>
+            <a:r>
+              <a:rPr lang="en-US" sz="3600" dirty="0" smtClean="0">
+                <a:solidFill>
+                  <a:schemeClr val="tx1"/>
+                </a:solidFill>
+                <a:latin typeface="Calibri" panose="020F0502020204030204" pitchFamily="34" charset="0"/>
+              </a:rPr>
+              <a:t>a challenge.</a:t>
             </a:r>
             <a:endParaRPr lang="en-US" sz="3600" dirty="0">
               <a:solidFill>
@@ -3675,7 +3780,7 @@
           <a:blip r:embed="rId4" cstate="print">
             <a:extLst>
               <a:ext uri="{28A0092B-C50C-407E-A947-70E740481C1C}">
-                <a14:useLocalDpi xmlns:a14="http://schemas.microsoft.com/office/drawing/2010/main" xmlns="" val="0"/>
+                <a14:useLocalDpi xmlns="" xmlns:a14="http://schemas.microsoft.com/office/drawing/2010/main" val="0"/>
               </a:ext>
             </a:extLst>
           </a:blip>
@@ -3715,8 +3820,8 @@
         </p:nvSpPr>
         <p:spPr>
           <a:xfrm>
-            <a:off x="6400800" y="14173200"/>
-            <a:ext cx="7453661" cy="2971800"/>
+            <a:off x="6449568" y="14173200"/>
+            <a:ext cx="7342632" cy="2971800"/>
           </a:xfrm>
           <a:prstGeom prst="roundRect">
             <a:avLst/>
@@ -3761,7 +3866,25 @@
                 </a:solidFill>
                 <a:latin typeface="Calibri" panose="020F0502020204030204" pitchFamily="34" charset="0"/>
               </a:rPr>
-              <a:t>RocketTracks was originally conceptualized in 2011 as a mechanical structure that uses a manual control box.</a:t>
+              <a:t>RocketTracks was originally conceptualized in 2011 as a mechanical structure </a:t>
+            </a:r>
+            <a:r>
+              <a:rPr lang="en-US" sz="3600" dirty="0" smtClean="0">
+                <a:solidFill>
+                  <a:schemeClr val="tx1"/>
+                </a:solidFill>
+                <a:latin typeface="Calibri" panose="020F0502020204030204" pitchFamily="34" charset="0"/>
+              </a:rPr>
+              <a:t>controlled by a </a:t>
+            </a:r>
+            <a:r>
+              <a:rPr lang="en-US" sz="3600" dirty="0">
+                <a:solidFill>
+                  <a:schemeClr val="tx1"/>
+                </a:solidFill>
+                <a:latin typeface="Calibri" panose="020F0502020204030204" pitchFamily="34" charset="0"/>
+              </a:rPr>
+              <a:t>manual control box.</a:t>
             </a:r>
           </a:p>
         </p:txBody>
@@ -3778,7 +3901,7 @@
           <a:blip r:embed="rId5" cstate="print">
             <a:extLst>
               <a:ext uri="{28A0092B-C50C-407E-A947-70E740481C1C}">
-                <a14:useLocalDpi xmlns:a14="http://schemas.microsoft.com/office/drawing/2010/main" xmlns="" val="0"/>
+                <a14:useLocalDpi xmlns="" xmlns:a14="http://schemas.microsoft.com/office/drawing/2010/main" val="0"/>
               </a:ext>
             </a:extLst>
           </a:blip>
@@ -3819,7 +3942,7 @@
         <p:spPr>
           <a:xfrm>
             <a:off x="6477000" y="17373600"/>
-            <a:ext cx="7391400" cy="3260185"/>
+            <a:ext cx="7342632" cy="3260185"/>
           </a:xfrm>
           <a:prstGeom prst="roundRect">
             <a:avLst/>
@@ -3966,7 +4089,25 @@
                 </a:solidFill>
                 <a:latin typeface="Calibri" panose="020F0502020204030204" pitchFamily="34" charset="0"/>
               </a:rPr>
-              <a:t>Eliminate room for human error by adding automatic tracking capabilities to the existing RocketTracks system.</a:t>
+              <a:t>Eliminate </a:t>
+            </a:r>
+            <a:r>
+              <a:rPr lang="en-US" sz="3600" dirty="0" smtClean="0">
+                <a:solidFill>
+                  <a:schemeClr val="tx1"/>
+                </a:solidFill>
+                <a:latin typeface="Calibri" panose="020F0502020204030204" pitchFamily="34" charset="0"/>
+              </a:rPr>
+              <a:t>human </a:t>
+            </a:r>
+            <a:r>
+              <a:rPr lang="en-US" sz="3600" dirty="0" smtClean="0">
+                <a:solidFill>
+                  <a:schemeClr val="tx1"/>
+                </a:solidFill>
+                <a:latin typeface="Calibri" panose="020F0502020204030204" pitchFamily="34" charset="0"/>
+              </a:rPr>
+              <a:t>error by adding automatic tracking capabilities to the existing RocketTracks system.</a:t>
             </a:r>
           </a:p>
         </p:txBody>
@@ -4020,7 +4161,7 @@
         </p:nvSpPr>
         <p:spPr>
           <a:xfrm>
-            <a:off x="914400" y="25782312"/>
+            <a:off x="914400" y="25862280"/>
             <a:ext cx="13258800" cy="6217920"/>
           </a:xfrm>
           <a:prstGeom prst="roundRect">
@@ -4070,8 +4211,68 @@
                 </a:solidFill>
                 <a:latin typeface="Calibri" panose="020F0502020204030204" pitchFamily="34" charset="0"/>
               </a:rPr>
-              <a:t>Redo manual controller to improve its control loop and interface via Ethernet</a:t>
-            </a:r>
+              <a:t>Create </a:t>
+            </a:r>
+            <a:r>
+              <a:rPr lang="en-US" sz="3600" dirty="0" err="1" smtClean="0">
+                <a:solidFill>
+                  <a:schemeClr val="tx1"/>
+                </a:solidFill>
+                <a:latin typeface="Calibri" panose="020F0502020204030204" pitchFamily="34" charset="0"/>
+              </a:rPr>
+              <a:t>RocketTracks</a:t>
+            </a:r>
+            <a:r>
+              <a:rPr lang="en-US" sz="3600" dirty="0" smtClean="0">
+                <a:solidFill>
+                  <a:schemeClr val="tx1"/>
+                </a:solidFill>
+                <a:latin typeface="Calibri" panose="020F0502020204030204" pitchFamily="34" charset="0"/>
+              </a:rPr>
+              <a:t> </a:t>
+            </a:r>
+            <a:r>
+              <a:rPr lang="en-US" sz="3600" dirty="0" smtClean="0">
+                <a:solidFill>
+                  <a:schemeClr val="tx1"/>
+                </a:solidFill>
+                <a:latin typeface="Calibri" panose="020F0502020204030204" pitchFamily="34" charset="0"/>
+              </a:rPr>
+              <a:t>controller board to interface mechanical system </a:t>
+            </a:r>
+            <a:r>
+              <a:rPr lang="en-US" sz="3600" dirty="0" smtClean="0">
+                <a:solidFill>
+                  <a:schemeClr val="tx1"/>
+                </a:solidFill>
+                <a:latin typeface="Calibri" panose="020F0502020204030204" pitchFamily="34" charset="0"/>
+              </a:rPr>
+              <a:t>with automatic and manual </a:t>
+            </a:r>
+            <a:r>
+              <a:rPr lang="en-US" sz="3600" dirty="0" smtClean="0">
+                <a:solidFill>
+                  <a:schemeClr val="tx1"/>
+                </a:solidFill>
+                <a:latin typeface="Calibri" panose="020F0502020204030204" pitchFamily="34" charset="0"/>
+              </a:rPr>
+              <a:t>control </a:t>
+            </a:r>
+            <a:r>
+              <a:rPr lang="en-US" sz="3600" dirty="0" smtClean="0">
+                <a:solidFill>
+                  <a:schemeClr val="tx1"/>
+                </a:solidFill>
+                <a:latin typeface="Calibri" panose="020F0502020204030204" pitchFamily="34" charset="0"/>
+              </a:rPr>
+              <a:t>boards</a:t>
+            </a:r>
+            <a:endParaRPr lang="en-US" sz="3600" dirty="0" smtClean="0">
+              <a:solidFill>
+                <a:schemeClr val="tx1"/>
+              </a:solidFill>
+              <a:latin typeface="Calibri" panose="020F0502020204030204" pitchFamily="34" charset="0"/>
+            </a:endParaRPr>
           </a:p>
           <a:p>
             <a:pPr marL="571500" indent="-571500">
@@ -4085,7 +4286,25 @@
                 </a:solidFill>
                 <a:latin typeface="Calibri" panose="020F0502020204030204" pitchFamily="34" charset="0"/>
               </a:rPr>
-              <a:t>Interface with Sightline SLA-1500 to add automatic tracking</a:t>
+              <a:t>Implement Ethernet for communication between different blocks of </a:t>
+            </a:r>
+            <a:r>
+              <a:rPr lang="en-US" sz="3600" dirty="0" err="1" smtClean="0">
+                <a:solidFill>
+                  <a:schemeClr val="tx1"/>
+                </a:solidFill>
+                <a:latin typeface="Calibri" panose="020F0502020204030204" pitchFamily="34" charset="0"/>
+              </a:rPr>
+              <a:t>RocketTracks</a:t>
+            </a:r>
+            <a:r>
+              <a:rPr lang="en-US" sz="3600" dirty="0" smtClean="0">
+                <a:solidFill>
+                  <a:schemeClr val="tx1"/>
+                </a:solidFill>
+                <a:latin typeface="Calibri" panose="020F0502020204030204" pitchFamily="34" charset="0"/>
+              </a:rPr>
+              <a:t> system </a:t>
             </a:r>
           </a:p>
           <a:p>
@@ -4100,7 +4319,16 @@
                 </a:solidFill>
                 <a:latin typeface="Calibri" panose="020F0502020204030204" pitchFamily="34" charset="0"/>
               </a:rPr>
-              <a:t>Create RTx controller board to interface between the mechanical system and the two control boards</a:t>
+              <a:t>Interface </a:t>
+            </a:r>
+            <a:r>
+              <a:rPr lang="en-US" sz="3600" dirty="0" smtClean="0">
+                <a:solidFill>
+                  <a:schemeClr val="tx1"/>
+                </a:solidFill>
+                <a:latin typeface="Calibri" panose="020F0502020204030204" pitchFamily="34" charset="0"/>
+              </a:rPr>
+              <a:t>with Sightline SLA-1500 to add automatic tracking</a:t>
             </a:r>
           </a:p>
           <a:p>
@@ -4115,7 +4343,16 @@
                 </a:solidFill>
                 <a:latin typeface="Calibri" panose="020F0502020204030204" pitchFamily="34" charset="0"/>
               </a:rPr>
-              <a:t>Implement Ethernet for communication between different blocks of RocketTracks system </a:t>
+              <a:t>Improve control loop for manual controller </a:t>
+            </a:r>
+            <a:r>
+              <a:rPr lang="en-US" sz="3600" dirty="0" smtClean="0">
+                <a:solidFill>
+                  <a:schemeClr val="tx1"/>
+                </a:solidFill>
+                <a:latin typeface="Calibri" panose="020F0502020204030204" pitchFamily="34" charset="0"/>
+              </a:rPr>
+              <a:t>and interface via Ethernet</a:t>
             </a:r>
           </a:p>
           <a:p>
@@ -4130,7 +4367,52 @@
                 </a:solidFill>
                 <a:latin typeface="Calibri" panose="020F0502020204030204" pitchFamily="34" charset="0"/>
               </a:rPr>
-              <a:t>Preform FMEA analysis and safety protocols to protect from injury or damage to system</a:t>
+              <a:t>Create safety protocols and perform </a:t>
+            </a:r>
+            <a:r>
+              <a:rPr lang="en-US" sz="3600" dirty="0" smtClean="0">
+                <a:solidFill>
+                  <a:schemeClr val="tx1"/>
+                </a:solidFill>
+                <a:latin typeface="Calibri" panose="020F0502020204030204" pitchFamily="34" charset="0"/>
+              </a:rPr>
+              <a:t>FMEA </a:t>
+            </a:r>
+            <a:r>
+              <a:rPr lang="en-US" sz="3600" dirty="0" smtClean="0">
+                <a:solidFill>
+                  <a:schemeClr val="tx1"/>
+                </a:solidFill>
+                <a:latin typeface="Calibri" panose="020F0502020204030204" pitchFamily="34" charset="0"/>
+              </a:rPr>
+              <a:t>analysis to </a:t>
+            </a:r>
+            <a:r>
+              <a:rPr lang="en-US" sz="3600" dirty="0" smtClean="0">
+                <a:solidFill>
+                  <a:schemeClr val="tx1"/>
+                </a:solidFill>
+                <a:latin typeface="Calibri" panose="020F0502020204030204" pitchFamily="34" charset="0"/>
+              </a:rPr>
+              <a:t>protect from </a:t>
+            </a:r>
+            <a:r>
+              <a:rPr lang="en-US" sz="3600" dirty="0" smtClean="0">
+                <a:solidFill>
+                  <a:schemeClr val="tx1"/>
+                </a:solidFill>
+                <a:latin typeface="Calibri" panose="020F0502020204030204" pitchFamily="34" charset="0"/>
+              </a:rPr>
+              <a:t>personal injury </a:t>
+            </a:r>
+            <a:r>
+              <a:rPr lang="en-US" sz="3600" dirty="0" smtClean="0">
+                <a:solidFill>
+                  <a:schemeClr val="tx1"/>
+                </a:solidFill>
+                <a:latin typeface="Calibri" panose="020F0502020204030204" pitchFamily="34" charset="0"/>
+              </a:rPr>
+              <a:t>or damage to system</a:t>
             </a:r>
           </a:p>
         </p:txBody>
@@ -4272,7 +4554,7 @@
               <a:blip r:embed="rId6" cstate="print">
                 <a:extLst>
                   <a:ext uri="{28A0092B-C50C-407E-A947-70E740481C1C}">
-                    <a14:useLocalDpi xmlns:a14="http://schemas.microsoft.com/office/drawing/2010/main" xmlns="" val="0"/>
+                    <a14:useLocalDpi xmlns="" xmlns:a14="http://schemas.microsoft.com/office/drawing/2010/main" val="0"/>
                   </a:ext>
                 </a:extLst>
               </a:blip>
@@ -4470,7 +4752,7 @@
             <a:blip r:embed="rId7" cstate="print">
               <a:extLst>
                 <a:ext uri="{28A0092B-C50C-407E-A947-70E740481C1C}">
-                  <a14:useLocalDpi xmlns:a14="http://schemas.microsoft.com/office/drawing/2010/main" xmlns="" val="0"/>
+                  <a14:useLocalDpi xmlns="" xmlns:a14="http://schemas.microsoft.com/office/drawing/2010/main" val="0"/>
                 </a:ext>
               </a:extLst>
             </a:blip>
@@ -4490,7 +4772,7 @@
             <a:noFill/>
             <a:extLst>
               <a:ext uri="{909E8E84-426E-40DD-AFC4-6F175D3DCCD1}">
-                <a14:hiddenFill xmlns:a14="http://schemas.microsoft.com/office/drawing/2010/main" xmlns="">
+                <a14:hiddenFill xmlns="" xmlns:a14="http://schemas.microsoft.com/office/drawing/2010/main">
                   <a:solidFill>
                     <a:srgbClr val="FFFFFF"/>
                   </a:solidFill>
@@ -4666,7 +4948,7 @@
             <a:blip r:embed="rId8" cstate="print">
               <a:extLst>
                 <a:ext uri="{28A0092B-C50C-407E-A947-70E740481C1C}">
-                  <a14:useLocalDpi xmlns:a14="http://schemas.microsoft.com/office/drawing/2010/main" xmlns="" val="0"/>
+                  <a14:useLocalDpi xmlns="" xmlns:a14="http://schemas.microsoft.com/office/drawing/2010/main" val="0"/>
                 </a:ext>
               </a:extLst>
             </a:blip>
@@ -4691,7 +4973,7 @@
             </a:ln>
             <a:extLst>
               <a:ext uri="{909E8E84-426E-40DD-AFC4-6F175D3DCCD1}">
-                <a14:hiddenFill xmlns:a14="http://schemas.microsoft.com/office/drawing/2010/main" xmlns="">
+                <a14:hiddenFill xmlns="" xmlns:a14="http://schemas.microsoft.com/office/drawing/2010/main">
                   <a:solidFill>
                     <a:srgbClr val="FFFFFF"/>
                   </a:solidFill>
@@ -4719,7 +5001,7 @@
               </a:duotone>
               <a:extLst>
                 <a:ext uri="{BEBA8EAE-BF5A-486C-A8C5-ECC9F3942E4B}">
-                  <a14:imgProps xmlns:a14="http://schemas.microsoft.com/office/drawing/2010/main" xmlns="">
+                  <a14:imgProps xmlns="" xmlns:a14="http://schemas.microsoft.com/office/drawing/2010/main">
                     <a14:imgLayer r:embed="rId10">
                       <a14:imgEffect>
                         <a14:saturation sat="400000"/>
@@ -4728,7 +5010,7 @@
                   </a14:imgProps>
                 </a:ext>
                 <a:ext uri="{28A0092B-C50C-407E-A947-70E740481C1C}">
-                  <a14:useLocalDpi xmlns:a14="http://schemas.microsoft.com/office/drawing/2010/main" xmlns="" val="0"/>
+                  <a14:useLocalDpi xmlns="" xmlns:a14="http://schemas.microsoft.com/office/drawing/2010/main" val="0"/>
                 </a:ext>
               </a:extLst>
             </a:blip>
@@ -4748,7 +5030,7 @@
             <a:noFill/>
             <a:extLst>
               <a:ext uri="{909E8E84-426E-40DD-AFC4-6F175D3DCCD1}">
-                <a14:hiddenFill xmlns:a14="http://schemas.microsoft.com/office/drawing/2010/main" xmlns="">
+                <a14:hiddenFill xmlns="" xmlns:a14="http://schemas.microsoft.com/office/drawing/2010/main">
                   <a:solidFill>
                     <a:srgbClr val="FFFFFF"/>
                   </a:solidFill>
@@ -5011,7 +5293,7 @@
             <a:blip r:embed="rId11" cstate="print">
               <a:extLst>
                 <a:ext uri="{28A0092B-C50C-407E-A947-70E740481C1C}">
-                  <a14:useLocalDpi xmlns:a14="http://schemas.microsoft.com/office/drawing/2010/main" xmlns="" val="0"/>
+                  <a14:useLocalDpi xmlns="" xmlns:a14="http://schemas.microsoft.com/office/drawing/2010/main" val="0"/>
                 </a:ext>
               </a:extLst>
             </a:blip>
@@ -5031,7 +5313,7 @@
             <a:noFill/>
             <a:extLst>
               <a:ext uri="{909E8E84-426E-40DD-AFC4-6F175D3DCCD1}">
-                <a14:hiddenFill xmlns:a14="http://schemas.microsoft.com/office/drawing/2010/main" xmlns="">
+                <a14:hiddenFill xmlns="" xmlns:a14="http://schemas.microsoft.com/office/drawing/2010/main">
                   <a:solidFill>
                     <a:srgbClr val="FFFFFF"/>
                   </a:solidFill>
@@ -5091,7 +5373,7 @@
             <a:blip r:embed="rId12" cstate="print">
               <a:extLst>
                 <a:ext uri="{28A0092B-C50C-407E-A947-70E740481C1C}">
-                  <a14:useLocalDpi xmlns:a14="http://schemas.microsoft.com/office/drawing/2010/main" xmlns="" val="0"/>
+                  <a14:useLocalDpi xmlns="" xmlns:a14="http://schemas.microsoft.com/office/drawing/2010/main" val="0"/>
                 </a:ext>
               </a:extLst>
             </a:blip>
@@ -5111,7 +5393,7 @@
             <a:noFill/>
             <a:extLst>
               <a:ext uri="{909E8E84-426E-40DD-AFC4-6F175D3DCCD1}">
-                <a14:hiddenFill xmlns:a14="http://schemas.microsoft.com/office/drawing/2010/main" xmlns="">
+                <a14:hiddenFill xmlns="" xmlns:a14="http://schemas.microsoft.com/office/drawing/2010/main">
                   <a:solidFill>
                     <a:srgbClr val="FFFFFF"/>
                   </a:solidFill>
@@ -5269,10 +5551,10 @@
         </p:nvGrpSpPr>
         <p:grpSpPr>
           <a:xfrm>
-            <a:off x="30061374" y="7189155"/>
-            <a:ext cx="12282579" cy="14041678"/>
-            <a:chOff x="31038078" y="16476084"/>
-            <a:chExt cx="11507043" cy="14041678"/>
+            <a:off x="30142711" y="7162800"/>
+            <a:ext cx="12453090" cy="14554200"/>
+            <a:chOff x="31114281" y="16449729"/>
+            <a:chExt cx="11666788" cy="14554200"/>
           </a:xfrm>
         </p:grpSpPr>
         <p:sp>
@@ -5283,8 +5565,8 @@
           </p:nvSpPr>
           <p:spPr>
             <a:xfrm>
-              <a:off x="34461276" y="16476084"/>
-              <a:ext cx="4480559" cy="1547195"/>
+              <a:off x="34731077" y="16449729"/>
+              <a:ext cx="4480560" cy="1547195"/>
             </a:xfrm>
             <a:prstGeom prst="roundRect">
               <a:avLst/>
@@ -5323,7 +5605,7 @@
             <a:p>
               <a:pPr algn="ctr"/>
               <a:r>
-                <a:rPr lang="en-US" sz="3600" dirty="0" smtClean="0">
+                <a:rPr lang="en-US" sz="3600" b="1" dirty="0" smtClean="0">
                   <a:solidFill>
                     <a:schemeClr val="tx1"/>
                   </a:solidFill>
@@ -5331,7 +5613,7 @@
                 </a:rPr>
                 <a:t>User selects mode</a:t>
               </a:r>
-              <a:endParaRPr lang="en-US" sz="3600" dirty="0">
+              <a:endParaRPr lang="en-US" sz="3600" b="1" dirty="0">
                 <a:solidFill>
                   <a:schemeClr val="tx1"/>
                 </a:solidFill>
@@ -5348,8 +5630,8 @@
           </p:nvSpPr>
           <p:spPr>
             <a:xfrm>
-              <a:off x="31114279" y="19156939"/>
-              <a:ext cx="5381626" cy="3770402"/>
+              <a:off x="31114281" y="19322347"/>
+              <a:ext cx="5568315" cy="6309360"/>
             </a:xfrm>
             <a:prstGeom prst="roundRect">
               <a:avLst/>
@@ -5415,7 +5697,52 @@
                   </a:solidFill>
                   <a:latin typeface="Calibri" panose="020F0502020204030204" pitchFamily="34" charset="0"/>
                 </a:rPr>
-                <a:t>User can adjust the position RocketTracks points by turning two nobs corresponding to the two axis</a:t>
+                <a:t>User can adjust the </a:t>
+              </a:r>
+              <a:r>
+                <a:rPr lang="en-US" sz="3600" dirty="0" smtClean="0">
+                  <a:solidFill>
+                    <a:schemeClr val="tx1"/>
+                  </a:solidFill>
+                  <a:latin typeface="Calibri" panose="020F0502020204030204" pitchFamily="34" charset="0"/>
+                </a:rPr>
+                <a:t>direction that </a:t>
+              </a:r>
+              <a:r>
+                <a:rPr lang="en-US" sz="3600" dirty="0" smtClean="0">
+                  <a:solidFill>
+                    <a:schemeClr val="tx1"/>
+                  </a:solidFill>
+                  <a:latin typeface="Calibri" panose="020F0502020204030204" pitchFamily="34" charset="0"/>
+                </a:rPr>
+                <a:t>RocketTracks points by turning two nobs corresponding </a:t>
+              </a:r>
+              <a:r>
+                <a:rPr lang="en-US" sz="3600" dirty="0" smtClean="0">
+                  <a:solidFill>
+                    <a:schemeClr val="tx1"/>
+                  </a:solidFill>
+                  <a:latin typeface="Calibri" panose="020F0502020204030204" pitchFamily="34" charset="0"/>
+                </a:rPr>
+                <a:t>to the </a:t>
+              </a:r>
+              <a:r>
+                <a:rPr lang="en-US" sz="3600" dirty="0" smtClean="0">
+                  <a:solidFill>
+                    <a:schemeClr val="tx1"/>
+                  </a:solidFill>
+                  <a:latin typeface="Calibri" panose="020F0502020204030204" pitchFamily="34" charset="0"/>
+                </a:rPr>
+                <a:t>horizontal and vertical a</a:t>
+              </a:r>
+              <a:r>
+                <a:rPr lang="en-US" sz="3600" dirty="0" smtClean="0">
+                  <a:solidFill>
+                    <a:schemeClr val="tx1"/>
+                  </a:solidFill>
+                  <a:latin typeface="Calibri" panose="020F0502020204030204" pitchFamily="34" charset="0"/>
+                </a:rPr>
+                <a:t>xes</a:t>
               </a:r>
               <a:endParaRPr lang="en-US" sz="3600" dirty="0">
                 <a:solidFill>
@@ -5434,8 +5761,8 @@
           </p:nvSpPr>
           <p:spPr>
             <a:xfrm>
-              <a:off x="37831383" y="19103721"/>
-              <a:ext cx="4713738" cy="7388662"/>
+              <a:off x="37212755" y="19269129"/>
+              <a:ext cx="5568314" cy="6309360"/>
             </a:xfrm>
             <a:prstGeom prst="roundRect">
               <a:avLst/>
@@ -5510,8 +5837,41 @@
                   </a:solidFill>
                   <a:latin typeface="Calibri" panose="020F0502020204030204" pitchFamily="34" charset="0"/>
                 </a:rPr>
-                <a:t> Camera provides feedback to Sightline as to position of rocket.</a:t>
+                <a:t> Camera provides feedback to </a:t>
               </a:r>
+              <a:r>
+                <a:rPr lang="en-US" sz="3600" dirty="0" smtClean="0">
+                  <a:solidFill>
+                    <a:schemeClr val="tx1"/>
+                  </a:solidFill>
+                  <a:latin typeface="Calibri" panose="020F0502020204030204" pitchFamily="34" charset="0"/>
+                </a:rPr>
+                <a:t>Sightline® as </a:t>
+              </a:r>
+              <a:r>
+                <a:rPr lang="en-US" sz="3600" dirty="0" smtClean="0">
+                  <a:solidFill>
+                    <a:schemeClr val="tx1"/>
+                  </a:solidFill>
+                  <a:latin typeface="Calibri" panose="020F0502020204030204" pitchFamily="34" charset="0"/>
+                </a:rPr>
+                <a:t>to position of </a:t>
+              </a:r>
+              <a:r>
+                <a:rPr lang="en-US" sz="3600" dirty="0" smtClean="0">
+                  <a:solidFill>
+                    <a:schemeClr val="tx1"/>
+                  </a:solidFill>
+                  <a:latin typeface="Calibri" panose="020F0502020204030204" pitchFamily="34" charset="0"/>
+                </a:rPr>
+                <a:t>the object.</a:t>
+              </a:r>
+              <a:endParaRPr lang="en-US" sz="3600" dirty="0" smtClean="0">
+                <a:solidFill>
+                  <a:schemeClr val="tx1"/>
+                </a:solidFill>
+                <a:latin typeface="Calibri" panose="020F0502020204030204" pitchFamily="34" charset="0"/>
+              </a:endParaRPr>
             </a:p>
             <a:p>
               <a:pPr marL="571500" indent="-571500" algn="ctr">
@@ -5525,7 +5885,25 @@
                   </a:solidFill>
                   <a:latin typeface="Calibri" panose="020F0502020204030204" pitchFamily="34" charset="0"/>
                 </a:rPr>
-                <a:t>RTx Controller adjusts position accordingly </a:t>
+                <a:t>RTx Controller adjusts </a:t>
+              </a:r>
+              <a:r>
+                <a:rPr lang="en-US" sz="3600" dirty="0" smtClean="0">
+                  <a:solidFill>
+                    <a:schemeClr val="tx1"/>
+                  </a:solidFill>
+                  <a:latin typeface="Calibri" panose="020F0502020204030204" pitchFamily="34" charset="0"/>
+                </a:rPr>
+                <a:t>mechanical position </a:t>
+              </a:r>
+              <a:r>
+                <a:rPr lang="en-US" sz="3600" dirty="0" smtClean="0">
+                  <a:solidFill>
+                    <a:schemeClr val="tx1"/>
+                  </a:solidFill>
+                  <a:latin typeface="Calibri" panose="020F0502020204030204" pitchFamily="34" charset="0"/>
+                </a:rPr>
+                <a:t>accordingly </a:t>
               </a:r>
               <a:endParaRPr lang="en-US" sz="3600" dirty="0">
                 <a:solidFill>
@@ -5544,8 +5922,8 @@
           </p:nvCxnSpPr>
           <p:spPr>
             <a:xfrm flipH="1">
-              <a:off x="35197858" y="18017608"/>
-              <a:ext cx="549380" cy="1139331"/>
+              <a:off x="34856929" y="17973729"/>
+              <a:ext cx="890312" cy="1295400"/>
             </a:xfrm>
             <a:prstGeom prst="straightConnector1">
               <a:avLst/>
@@ -5577,8 +5955,8 @@
           </p:nvCxnSpPr>
           <p:spPr>
             <a:xfrm>
-              <a:off x="37471319" y="18017608"/>
-              <a:ext cx="720129" cy="1139331"/>
+              <a:off x="38205953" y="17977397"/>
+              <a:ext cx="890930" cy="1298448"/>
             </a:xfrm>
             <a:prstGeom prst="straightConnector1">
               <a:avLst/>
@@ -5610,8 +5988,8 @@
           </p:nvSpPr>
           <p:spPr>
             <a:xfrm>
-              <a:off x="31038078" y="23684449"/>
-              <a:ext cx="5782479" cy="6833313"/>
+              <a:off x="32786658" y="26889129"/>
+              <a:ext cx="8852192" cy="4114800"/>
             </a:xfrm>
             <a:prstGeom prst="roundRect">
               <a:avLst/>
@@ -5656,8 +6034,23 @@
                   </a:solidFill>
                   <a:latin typeface="Calibri" panose="020F0502020204030204" pitchFamily="34" charset="0"/>
                 </a:rPr>
-                <a:t>Emergency Stop:</a:t>
+                <a:t>Emergency </a:t>
               </a:r>
+              <a:r>
+                <a:rPr lang="en-US" sz="3600" b="1" dirty="0" smtClean="0">
+                  <a:solidFill>
+                    <a:schemeClr val="tx1"/>
+                  </a:solidFill>
+                  <a:latin typeface="Calibri" panose="020F0502020204030204" pitchFamily="34" charset="0"/>
+                </a:rPr>
+                <a:t>Stop</a:t>
+              </a:r>
+              <a:endParaRPr lang="en-US" sz="3600" b="1" dirty="0" smtClean="0">
+                <a:solidFill>
+                  <a:schemeClr val="tx1"/>
+                </a:solidFill>
+                <a:latin typeface="Calibri" panose="020F0502020204030204" pitchFamily="34" charset="0"/>
+              </a:endParaRPr>
             </a:p>
             <a:p>
               <a:pPr algn="ctr"/>
@@ -5718,74 +6111,6 @@
             </a:p>
           </p:txBody>
         </p:sp>
-        <p:cxnSp>
-          <p:nvCxnSpPr>
-            <p:cNvPr id="132" name="Straight Arrow Connector 131"/>
-            <p:cNvCxnSpPr>
-              <a:endCxn id="115" idx="2"/>
-            </p:cNvCxnSpPr>
-            <p:nvPr/>
-          </p:nvCxnSpPr>
-          <p:spPr>
-            <a:xfrm flipV="1">
-              <a:off x="33805092" y="22927341"/>
-              <a:ext cx="1" cy="757107"/>
-            </a:xfrm>
-            <a:prstGeom prst="straightConnector1">
-              <a:avLst/>
-            </a:prstGeom>
-            <a:ln w="127000">
-              <a:tailEnd type="triangle"/>
-            </a:ln>
-          </p:spPr>
-          <p:style>
-            <a:lnRef idx="1">
-              <a:schemeClr val="accent1"/>
-            </a:lnRef>
-            <a:fillRef idx="0">
-              <a:schemeClr val="accent1"/>
-            </a:fillRef>
-            <a:effectRef idx="0">
-              <a:schemeClr val="accent1"/>
-            </a:effectRef>
-            <a:fontRef idx="minor">
-              <a:schemeClr val="tx1"/>
-            </a:fontRef>
-          </p:style>
-        </p:cxnSp>
-        <p:cxnSp>
-          <p:nvCxnSpPr>
-            <p:cNvPr id="135" name="Straight Arrow Connector 134"/>
-            <p:cNvCxnSpPr/>
-            <p:nvPr/>
-          </p:nvCxnSpPr>
-          <p:spPr>
-            <a:xfrm>
-              <a:off x="36820557" y="25235981"/>
-              <a:ext cx="1056380" cy="1"/>
-            </a:xfrm>
-            <a:prstGeom prst="straightConnector1">
-              <a:avLst/>
-            </a:prstGeom>
-            <a:ln w="127000">
-              <a:tailEnd type="triangle"/>
-            </a:ln>
-          </p:spPr>
-          <p:style>
-            <a:lnRef idx="1">
-              <a:schemeClr val="accent1"/>
-            </a:lnRef>
-            <a:fillRef idx="0">
-              <a:schemeClr val="accent1"/>
-            </a:fillRef>
-            <a:effectRef idx="0">
-              <a:schemeClr val="accent1"/>
-            </a:effectRef>
-            <a:fontRef idx="minor">
-              <a:schemeClr val="tx1"/>
-            </a:fontRef>
-          </p:style>
-        </p:cxnSp>
       </p:grpSp>
       <p:sp>
         <p:nvSpPr>
@@ -5848,7 +6173,7 @@
         </p:nvGrpSpPr>
         <p:grpSpPr>
           <a:xfrm>
-            <a:off x="29718000" y="24841200"/>
+            <a:off x="29718000" y="24878360"/>
             <a:ext cx="13258800" cy="7201840"/>
             <a:chOff x="29718000" y="24725960"/>
             <a:chExt cx="13258800" cy="7201840"/>
@@ -5968,7 +6293,7 @@
       </p:cxnSp>
       <p:pic>
         <p:nvPicPr>
-          <p:cNvPr id="5" name="Picture 2" descr="http://psas.pdx.edu/rockettracks/GMD_running.jpg"/>
+          <p:cNvPr id="5" name="Picture 2" descr="RTx controller board"/>
           <p:cNvPicPr>
             <a:picLocks noChangeAspect="1" noChangeArrowheads="1"/>
           </p:cNvPicPr>
@@ -5976,27 +6301,93 @@
         </p:nvPicPr>
         <p:blipFill>
           <a:blip r:embed="rId14" cstate="print"/>
-          <a:srcRect t="23366" b="25023"/>
+          <a:srcRect t="25899" b="20781"/>
           <a:stretch>
             <a:fillRect/>
           </a:stretch>
         </p:blipFill>
         <p:spPr bwMode="auto">
           <a:xfrm>
-            <a:off x="14709648" y="26974800"/>
-            <a:ext cx="14474952" cy="5001816"/>
+            <a:off x="14785848" y="26858592"/>
+            <a:ext cx="14474952" cy="5145408"/>
           </a:xfrm>
           <a:prstGeom prst="roundRect">
             <a:avLst/>
           </a:prstGeom>
           <a:noFill/>
-          <a:ln w="76200">
+          <a:ln w="101600">
             <a:solidFill>
               <a:srgbClr val="6A7F10"/>
             </a:solidFill>
           </a:ln>
         </p:spPr>
       </p:pic>
+      <p:cxnSp>
+        <p:nvCxnSpPr>
+          <p:cNvPr id="71" name="Straight Arrow Connector 70"/>
+          <p:cNvCxnSpPr/>
+          <p:nvPr/>
+        </p:nvCxnSpPr>
+        <p:spPr>
+          <a:xfrm flipH="1" flipV="1">
+            <a:off x="34442400" y="16306800"/>
+            <a:ext cx="950316" cy="1295400"/>
+          </a:xfrm>
+          <a:prstGeom prst="straightConnector1">
+            <a:avLst/>
+          </a:prstGeom>
+          <a:ln w="127000">
+            <a:tailEnd type="triangle"/>
+          </a:ln>
+        </p:spPr>
+        <p:style>
+          <a:lnRef idx="1">
+            <a:schemeClr val="accent1"/>
+          </a:lnRef>
+          <a:fillRef idx="0">
+            <a:schemeClr val="accent1"/>
+          </a:fillRef>
+          <a:effectRef idx="0">
+            <a:schemeClr val="accent1"/>
+          </a:effectRef>
+          <a:fontRef idx="minor">
+            <a:schemeClr val="tx1"/>
+          </a:fontRef>
+        </p:style>
+      </p:cxnSp>
+      <p:cxnSp>
+        <p:nvCxnSpPr>
+          <p:cNvPr id="72" name="Straight Arrow Connector 71"/>
+          <p:cNvCxnSpPr/>
+          <p:nvPr/>
+        </p:nvCxnSpPr>
+        <p:spPr>
+          <a:xfrm flipV="1">
+            <a:off x="38017137" y="16306800"/>
+            <a:ext cx="950976" cy="1298448"/>
+          </a:xfrm>
+          <a:prstGeom prst="straightConnector1">
+            <a:avLst/>
+          </a:prstGeom>
+          <a:ln w="127000">
+            <a:tailEnd type="triangle"/>
+          </a:ln>
+        </p:spPr>
+        <p:style>
+          <a:lnRef idx="1">
+            <a:schemeClr val="accent1"/>
+          </a:lnRef>
+          <a:fillRef idx="0">
+            <a:schemeClr val="accent1"/>
+          </a:fillRef>
+          <a:effectRef idx="0">
+            <a:schemeClr val="accent1"/>
+          </a:effectRef>
+          <a:fontRef idx="minor">
+            <a:schemeClr val="tx1"/>
+          </a:fontRef>
+        </p:style>
+      </p:cxnSp>
     </p:spTree>
   </p:cSld>
   <p:clrMapOvr>

</xml_diff>